<commit_message>
corrected errors and created new ReadMe
</commit_message>
<xml_diff>
--- a/sqlRelayCardiff2016.pptx
+++ b/sqlRelayCardiff2016.pptx
@@ -3659,7 +3659,43 @@
                   </a:outerShdw>
                 </a:effectLst>
               </a:rPr>
-              <a:t>You live North West or your office and only plan to search within a 2-mile radius.  You're hoping to find a good</a:t>
+              <a:t>You live North </a:t>
+            </a:r>
+            <a:r>
+              <a:rPr lang="en-GB" kern="0">
+                <a:solidFill>
+                  <a:schemeClr val="tx1">
+                    <a:lumMod val="65000"/>
+                    <a:lumOff val="35000"/>
+                  </a:schemeClr>
+                </a:solidFill>
+                <a:effectLst>
+                  <a:outerShdw blurRad="38100" dist="38100" dir="2700000" algn="tl">
+                    <a:srgbClr val="000000">
+                      <a:alpha val="43137"/>
+                    </a:srgbClr>
+                  </a:outerShdw>
+                </a:effectLst>
+              </a:rPr>
+              <a:t>West of </a:t>
+            </a:r>
+            <a:r>
+              <a:rPr lang="en-GB" kern="0" dirty="0">
+                <a:solidFill>
+                  <a:schemeClr val="tx1">
+                    <a:lumMod val="65000"/>
+                    <a:lumOff val="35000"/>
+                  </a:schemeClr>
+                </a:solidFill>
+                <a:effectLst>
+                  <a:outerShdw blurRad="38100" dist="38100" dir="2700000" algn="tl">
+                    <a:srgbClr val="000000">
+                      <a:alpha val="43137"/>
+                    </a:srgbClr>
+                  </a:outerShdw>
+                </a:effectLst>
+              </a:rPr>
+              <a:t>your office and only plan to search within a 2-mile radius.  You're hoping to find a good</a:t>
             </a:r>
           </a:p>
           <a:p>

</xml_diff>